<commit_message>
make figure text size consistent
</commit_message>
<xml_diff>
--- a/paper/v2/figures/loops.pptx
+++ b/paper/v2/figures/loops.pptx
@@ -243,7 +243,7 @@
           <a:p>
             <a:fld id="{D1C2FE12-02FD-40D2-9E73-08CF8D46514A}" type="datetimeFigureOut">
               <a:rPr lang="en-US" smtClean="0"/>
-              <a:t>6/21/16</a:t>
+              <a:t>6/22/16</a:t>
             </a:fld>
             <a:endParaRPr lang="en-US"/>
           </a:p>
@@ -413,7 +413,7 @@
           <a:p>
             <a:fld id="{D1C2FE12-02FD-40D2-9E73-08CF8D46514A}" type="datetimeFigureOut">
               <a:rPr lang="en-US" smtClean="0"/>
-              <a:t>6/21/16</a:t>
+              <a:t>6/22/16</a:t>
             </a:fld>
             <a:endParaRPr lang="en-US"/>
           </a:p>
@@ -593,7 +593,7 @@
           <a:p>
             <a:fld id="{D1C2FE12-02FD-40D2-9E73-08CF8D46514A}" type="datetimeFigureOut">
               <a:rPr lang="en-US" smtClean="0"/>
-              <a:t>6/21/16</a:t>
+              <a:t>6/22/16</a:t>
             </a:fld>
             <a:endParaRPr lang="en-US"/>
           </a:p>
@@ -763,7 +763,7 @@
           <a:p>
             <a:fld id="{D1C2FE12-02FD-40D2-9E73-08CF8D46514A}" type="datetimeFigureOut">
               <a:rPr lang="en-US" smtClean="0"/>
-              <a:t>6/21/16</a:t>
+              <a:t>6/22/16</a:t>
             </a:fld>
             <a:endParaRPr lang="en-US"/>
           </a:p>
@@ -1009,7 +1009,7 @@
           <a:p>
             <a:fld id="{D1C2FE12-02FD-40D2-9E73-08CF8D46514A}" type="datetimeFigureOut">
               <a:rPr lang="en-US" smtClean="0"/>
-              <a:t>6/21/16</a:t>
+              <a:t>6/22/16</a:t>
             </a:fld>
             <a:endParaRPr lang="en-US"/>
           </a:p>
@@ -1241,7 +1241,7 @@
           <a:p>
             <a:fld id="{D1C2FE12-02FD-40D2-9E73-08CF8D46514A}" type="datetimeFigureOut">
               <a:rPr lang="en-US" smtClean="0"/>
-              <a:t>6/21/16</a:t>
+              <a:t>6/22/16</a:t>
             </a:fld>
             <a:endParaRPr lang="en-US"/>
           </a:p>
@@ -1608,7 +1608,7 @@
           <a:p>
             <a:fld id="{D1C2FE12-02FD-40D2-9E73-08CF8D46514A}" type="datetimeFigureOut">
               <a:rPr lang="en-US" smtClean="0"/>
-              <a:t>6/21/16</a:t>
+              <a:t>6/22/16</a:t>
             </a:fld>
             <a:endParaRPr lang="en-US"/>
           </a:p>
@@ -1726,7 +1726,7 @@
           <a:p>
             <a:fld id="{D1C2FE12-02FD-40D2-9E73-08CF8D46514A}" type="datetimeFigureOut">
               <a:rPr lang="en-US" smtClean="0"/>
-              <a:t>6/21/16</a:t>
+              <a:t>6/22/16</a:t>
             </a:fld>
             <a:endParaRPr lang="en-US"/>
           </a:p>
@@ -1821,7 +1821,7 @@
           <a:p>
             <a:fld id="{D1C2FE12-02FD-40D2-9E73-08CF8D46514A}" type="datetimeFigureOut">
               <a:rPr lang="en-US" smtClean="0"/>
-              <a:t>6/21/16</a:t>
+              <a:t>6/22/16</a:t>
             </a:fld>
             <a:endParaRPr lang="en-US"/>
           </a:p>
@@ -2098,7 +2098,7 @@
           <a:p>
             <a:fld id="{D1C2FE12-02FD-40D2-9E73-08CF8D46514A}" type="datetimeFigureOut">
               <a:rPr lang="en-US" smtClean="0"/>
-              <a:t>6/21/16</a:t>
+              <a:t>6/22/16</a:t>
             </a:fld>
             <a:endParaRPr lang="en-US"/>
           </a:p>
@@ -2351,7 +2351,7 @@
           <a:p>
             <a:fld id="{D1C2FE12-02FD-40D2-9E73-08CF8D46514A}" type="datetimeFigureOut">
               <a:rPr lang="en-US" smtClean="0"/>
-              <a:t>6/21/16</a:t>
+              <a:t>6/22/16</a:t>
             </a:fld>
             <a:endParaRPr lang="en-US"/>
           </a:p>
@@ -2564,7 +2564,7 @@
           <a:p>
             <a:fld id="{D1C2FE12-02FD-40D2-9E73-08CF8D46514A}" type="datetimeFigureOut">
               <a:rPr lang="en-US" smtClean="0"/>
-              <a:t>6/21/16</a:t>
+              <a:t>6/22/16</a:t>
             </a:fld>
             <a:endParaRPr lang="en-US"/>
           </a:p>
@@ -2971,16 +2971,16 @@
       </p:grpSpPr>
       <p:grpSp>
         <p:nvGrpSpPr>
-          <p:cNvPr id="5" name="Group 4"/>
+          <p:cNvPr id="2" name="Group 1"/>
           <p:cNvGrpSpPr/>
           <p:nvPr/>
         </p:nvGrpSpPr>
         <p:grpSpPr>
           <a:xfrm>
             <a:off x="6489139" y="2553058"/>
-            <a:ext cx="3500554" cy="2400435"/>
+            <a:ext cx="4104401" cy="2400435"/>
             <a:chOff x="6489139" y="2553058"/>
-            <a:chExt cx="3500554" cy="2400435"/>
+            <a:chExt cx="4104401" cy="2400435"/>
           </a:xfrm>
         </p:grpSpPr>
         <p:cxnSp>
@@ -3093,14 +3093,12 @@
         <p:cxnSp>
           <p:nvCxnSpPr>
             <p:cNvPr id="117" name="Straight Arrow Connector 116"/>
-            <p:cNvCxnSpPr>
-              <a:endCxn id="109" idx="0"/>
-            </p:cNvCxnSpPr>
+            <p:cNvCxnSpPr/>
             <p:nvPr/>
           </p:nvCxnSpPr>
           <p:spPr>
             <a:xfrm flipH="1">
-              <a:off x="8817189" y="3619500"/>
+              <a:off x="9421036" y="3619500"/>
               <a:ext cx="467964" cy="415320"/>
             </a:xfrm>
             <a:prstGeom prst="straightConnector1">
@@ -3131,14 +3129,12 @@
         <p:cxnSp>
           <p:nvCxnSpPr>
             <p:cNvPr id="119" name="Straight Arrow Connector 118"/>
-            <p:cNvCxnSpPr>
-              <a:endCxn id="113" idx="0"/>
-            </p:cNvCxnSpPr>
+            <p:cNvCxnSpPr/>
             <p:nvPr/>
           </p:nvCxnSpPr>
           <p:spPr>
             <a:xfrm>
-              <a:off x="9285153" y="3619500"/>
+              <a:off x="9889000" y="3619500"/>
               <a:ext cx="409820" cy="429110"/>
             </a:xfrm>
             <a:prstGeom prst="straightConnector1">
@@ -3174,7 +3170,7 @@
           </p:nvGrpSpPr>
           <p:grpSpPr>
             <a:xfrm>
-              <a:off x="8990433" y="3361933"/>
+              <a:off x="9594280" y="3361933"/>
               <a:ext cx="589441" cy="561314"/>
               <a:chOff x="2064189" y="1140737"/>
               <a:chExt cx="589441" cy="561314"/>
@@ -3401,7 +3397,7 @@
           </p:nvSpPr>
           <p:spPr>
             <a:xfrm>
-              <a:off x="9471994" y="4577726"/>
+              <a:off x="10075841" y="4577726"/>
               <a:ext cx="445956" cy="369332"/>
             </a:xfrm>
             <a:prstGeom prst="rect">
@@ -3432,7 +3428,7 @@
           </p:nvSpPr>
           <p:spPr>
             <a:xfrm>
-              <a:off x="8599439" y="4571376"/>
+              <a:off x="9203286" y="4571376"/>
               <a:ext cx="445956" cy="369332"/>
             </a:xfrm>
             <a:prstGeom prst="rect">
@@ -3599,7 +3595,7 @@
           </p:nvCxnSpPr>
           <p:spPr>
             <a:xfrm>
-              <a:off x="9285153" y="3058186"/>
+              <a:off x="9889000" y="3058186"/>
               <a:ext cx="1" cy="303747"/>
             </a:xfrm>
             <a:prstGeom prst="straightConnector1">
@@ -3970,7 +3966,7 @@
           </p:nvCxnSpPr>
           <p:spPr>
             <a:xfrm flipV="1">
-              <a:off x="8638688" y="3889146"/>
+              <a:off x="9242535" y="3889146"/>
               <a:ext cx="467965" cy="403725"/>
             </a:xfrm>
             <a:prstGeom prst="straightConnector1">
@@ -4006,7 +4002,7 @@
           </p:nvCxnSpPr>
           <p:spPr>
             <a:xfrm flipH="1" flipV="1">
-              <a:off x="9442627" y="3895845"/>
+              <a:off x="10046474" y="3895845"/>
               <a:ext cx="311099" cy="299575"/>
             </a:xfrm>
             <a:prstGeom prst="straightConnector1">
@@ -4042,7 +4038,7 @@
           </p:nvGrpSpPr>
           <p:grpSpPr>
             <a:xfrm>
-              <a:off x="9400252" y="4048610"/>
+              <a:off x="10004099" y="4048610"/>
               <a:ext cx="589441" cy="561314"/>
               <a:chOff x="2064189" y="1140737"/>
               <a:chExt cx="589441" cy="561314"/>
@@ -4140,7 +4136,7 @@
           </p:nvGrpSpPr>
           <p:grpSpPr>
             <a:xfrm>
-              <a:off x="8522468" y="4034820"/>
+              <a:off x="9126315" y="4034820"/>
               <a:ext cx="589441" cy="561314"/>
               <a:chOff x="2064189" y="1140737"/>
               <a:chExt cx="589441" cy="561314"/>
@@ -4231,6 +4227,32 @@
           </p:sp>
         </p:grpSp>
       </p:grpSp>
+      <p:sp>
+        <p:nvSpPr>
+          <p:cNvPr id="3" name="TextBox 2"/>
+          <p:cNvSpPr txBox="1"/>
+          <p:nvPr/>
+        </p:nvSpPr>
+        <p:spPr>
+          <a:xfrm>
+            <a:off x="6616460" y="3424687"/>
+            <a:ext cx="184731" cy="369332"/>
+          </a:xfrm>
+          <a:prstGeom prst="rect">
+            <a:avLst/>
+          </a:prstGeom>
+          <a:noFill/>
+        </p:spPr>
+        <p:txBody>
+          <a:bodyPr wrap="none" rtlCol="0">
+            <a:spAutoFit/>
+          </a:bodyPr>
+          <a:lstStyle/>
+          <a:p>
+            <a:endParaRPr lang="en-US" dirty="0"/>
+          </a:p>
+        </p:txBody>
+      </p:sp>
     </p:spTree>
     <p:extLst>
       <p:ext uri="{BB962C8B-B14F-4D97-AF65-F5344CB8AC3E}">

</xml_diff>